<commit_message>
New logo in Architecture.pptx (better color match with ExcelMvc colors)
</commit_message>
<xml_diff>
--- a/Docs/Architecture.pptx
+++ b/Docs/Architecture.pptx
@@ -288,7 +288,7 @@
           <a:p>
             <a:fld id="{1FE39806-6DEB-4B68-BC5B-6361243A445C}" type="datetimeFigureOut">
               <a:rPr lang="en-AU" smtClean="0"/>
-              <a:t>9/06/2014</a:t>
+              <a:t>16/06/2014</a:t>
             </a:fld>
             <a:endParaRPr lang="en-AU"/>
           </a:p>
@@ -458,7 +458,7 @@
           <a:p>
             <a:fld id="{1FE39806-6DEB-4B68-BC5B-6361243A445C}" type="datetimeFigureOut">
               <a:rPr lang="en-AU" smtClean="0"/>
-              <a:t>9/06/2014</a:t>
+              <a:t>16/06/2014</a:t>
             </a:fld>
             <a:endParaRPr lang="en-AU"/>
           </a:p>
@@ -638,7 +638,7 @@
           <a:p>
             <a:fld id="{1FE39806-6DEB-4B68-BC5B-6361243A445C}" type="datetimeFigureOut">
               <a:rPr lang="en-AU" smtClean="0"/>
-              <a:t>9/06/2014</a:t>
+              <a:t>16/06/2014</a:t>
             </a:fld>
             <a:endParaRPr lang="en-AU"/>
           </a:p>
@@ -808,7 +808,7 @@
           <a:p>
             <a:fld id="{1FE39806-6DEB-4B68-BC5B-6361243A445C}" type="datetimeFigureOut">
               <a:rPr lang="en-AU" smtClean="0"/>
-              <a:t>9/06/2014</a:t>
+              <a:t>16/06/2014</a:t>
             </a:fld>
             <a:endParaRPr lang="en-AU"/>
           </a:p>
@@ -1054,7 +1054,7 @@
           <a:p>
             <a:fld id="{1FE39806-6DEB-4B68-BC5B-6361243A445C}" type="datetimeFigureOut">
               <a:rPr lang="en-AU" smtClean="0"/>
-              <a:t>9/06/2014</a:t>
+              <a:t>16/06/2014</a:t>
             </a:fld>
             <a:endParaRPr lang="en-AU"/>
           </a:p>
@@ -1342,7 +1342,7 @@
           <a:p>
             <a:fld id="{1FE39806-6DEB-4B68-BC5B-6361243A445C}" type="datetimeFigureOut">
               <a:rPr lang="en-AU" smtClean="0"/>
-              <a:t>9/06/2014</a:t>
+              <a:t>16/06/2014</a:t>
             </a:fld>
             <a:endParaRPr lang="en-AU"/>
           </a:p>
@@ -1764,7 +1764,7 @@
           <a:p>
             <a:fld id="{1FE39806-6DEB-4B68-BC5B-6361243A445C}" type="datetimeFigureOut">
               <a:rPr lang="en-AU" smtClean="0"/>
-              <a:t>9/06/2014</a:t>
+              <a:t>16/06/2014</a:t>
             </a:fld>
             <a:endParaRPr lang="en-AU"/>
           </a:p>
@@ -1882,7 +1882,7 @@
           <a:p>
             <a:fld id="{1FE39806-6DEB-4B68-BC5B-6361243A445C}" type="datetimeFigureOut">
               <a:rPr lang="en-AU" smtClean="0"/>
-              <a:t>9/06/2014</a:t>
+              <a:t>16/06/2014</a:t>
             </a:fld>
             <a:endParaRPr lang="en-AU"/>
           </a:p>
@@ -1977,7 +1977,7 @@
           <a:p>
             <a:fld id="{1FE39806-6DEB-4B68-BC5B-6361243A445C}" type="datetimeFigureOut">
               <a:rPr lang="en-AU" smtClean="0"/>
-              <a:t>9/06/2014</a:t>
+              <a:t>16/06/2014</a:t>
             </a:fld>
             <a:endParaRPr lang="en-AU"/>
           </a:p>
@@ -2254,7 +2254,7 @@
           <a:p>
             <a:fld id="{1FE39806-6DEB-4B68-BC5B-6361243A445C}" type="datetimeFigureOut">
               <a:rPr lang="en-AU" smtClean="0"/>
-              <a:t>9/06/2014</a:t>
+              <a:t>16/06/2014</a:t>
             </a:fld>
             <a:endParaRPr lang="en-AU"/>
           </a:p>
@@ -2507,7 +2507,7 @@
           <a:p>
             <a:fld id="{1FE39806-6DEB-4B68-BC5B-6361243A445C}" type="datetimeFigureOut">
               <a:rPr lang="en-AU" smtClean="0"/>
-              <a:t>9/06/2014</a:t>
+              <a:t>16/06/2014</a:t>
             </a:fld>
             <a:endParaRPr lang="en-AU"/>
           </a:p>
@@ -2720,7 +2720,7 @@
           <a:p>
             <a:fld id="{1FE39806-6DEB-4B68-BC5B-6361243A445C}" type="datetimeFigureOut">
               <a:rPr lang="en-AU" smtClean="0"/>
-              <a:t>9/06/2014</a:t>
+              <a:t>16/06/2014</a:t>
             </a:fld>
             <a:endParaRPr lang="en-AU"/>
           </a:p>
@@ -3111,15 +3111,14 @@
               </a:ext>
             </a:extLst>
           </a:blip>
-          <a:srcRect/>
           <a:stretch>
             <a:fillRect/>
           </a:stretch>
         </p:blipFill>
         <p:spPr bwMode="auto">
           <a:xfrm>
-            <a:off x="899592" y="476672"/>
-            <a:ext cx="1470025" cy="1466850"/>
+            <a:off x="901179" y="476672"/>
+            <a:ext cx="1466850" cy="1466850"/>
           </a:xfrm>
           <a:prstGeom prst="rect">
             <a:avLst/>

</xml_diff>